<commit_message>
Adjust times for examples in powerpoint presentation
</commit_message>
<xml_diff>
--- a/Session1.pptx
+++ b/Session1.pptx
@@ -268,7 +268,7 @@
           <a:p>
             <a:fld id="{4BC9F52D-9A22-FD41-AB33-E3ECE032C061}" type="datetimeFigureOut">
               <a:rPr lang="en-DE" smtClean="0"/>
-              <a:t>13.12.22</a:t>
+              <a:t>14.12.22</a:t>
             </a:fld>
             <a:endParaRPr lang="en-DE"/>
           </a:p>
@@ -468,7 +468,7 @@
           <a:p>
             <a:fld id="{4BC9F52D-9A22-FD41-AB33-E3ECE032C061}" type="datetimeFigureOut">
               <a:rPr lang="en-DE" smtClean="0"/>
-              <a:t>13.12.22</a:t>
+              <a:t>14.12.22</a:t>
             </a:fld>
             <a:endParaRPr lang="en-DE"/>
           </a:p>
@@ -678,7 +678,7 @@
           <a:p>
             <a:fld id="{4BC9F52D-9A22-FD41-AB33-E3ECE032C061}" type="datetimeFigureOut">
               <a:rPr lang="en-DE" smtClean="0"/>
-              <a:t>13.12.22</a:t>
+              <a:t>14.12.22</a:t>
             </a:fld>
             <a:endParaRPr lang="en-DE"/>
           </a:p>
@@ -878,7 +878,7 @@
           <a:p>
             <a:fld id="{4BC9F52D-9A22-FD41-AB33-E3ECE032C061}" type="datetimeFigureOut">
               <a:rPr lang="en-DE" smtClean="0"/>
-              <a:t>13.12.22</a:t>
+              <a:t>14.12.22</a:t>
             </a:fld>
             <a:endParaRPr lang="en-DE"/>
           </a:p>
@@ -1154,7 +1154,7 @@
           <a:p>
             <a:fld id="{4BC9F52D-9A22-FD41-AB33-E3ECE032C061}" type="datetimeFigureOut">
               <a:rPr lang="en-DE" smtClean="0"/>
-              <a:t>13.12.22</a:t>
+              <a:t>14.12.22</a:t>
             </a:fld>
             <a:endParaRPr lang="en-DE"/>
           </a:p>
@@ -1422,7 +1422,7 @@
           <a:p>
             <a:fld id="{4BC9F52D-9A22-FD41-AB33-E3ECE032C061}" type="datetimeFigureOut">
               <a:rPr lang="en-DE" smtClean="0"/>
-              <a:t>13.12.22</a:t>
+              <a:t>14.12.22</a:t>
             </a:fld>
             <a:endParaRPr lang="en-DE"/>
           </a:p>
@@ -1837,7 +1837,7 @@
           <a:p>
             <a:fld id="{4BC9F52D-9A22-FD41-AB33-E3ECE032C061}" type="datetimeFigureOut">
               <a:rPr lang="en-DE" smtClean="0"/>
-              <a:t>13.12.22</a:t>
+              <a:t>14.12.22</a:t>
             </a:fld>
             <a:endParaRPr lang="en-DE"/>
           </a:p>
@@ -1979,7 +1979,7 @@
           <a:p>
             <a:fld id="{4BC9F52D-9A22-FD41-AB33-E3ECE032C061}" type="datetimeFigureOut">
               <a:rPr lang="en-DE" smtClean="0"/>
-              <a:t>13.12.22</a:t>
+              <a:t>14.12.22</a:t>
             </a:fld>
             <a:endParaRPr lang="en-DE"/>
           </a:p>
@@ -2092,7 +2092,7 @@
           <a:p>
             <a:fld id="{4BC9F52D-9A22-FD41-AB33-E3ECE032C061}" type="datetimeFigureOut">
               <a:rPr lang="en-DE" smtClean="0"/>
-              <a:t>13.12.22</a:t>
+              <a:t>14.12.22</a:t>
             </a:fld>
             <a:endParaRPr lang="en-DE"/>
           </a:p>
@@ -2405,7 +2405,7 @@
           <a:p>
             <a:fld id="{4BC9F52D-9A22-FD41-AB33-E3ECE032C061}" type="datetimeFigureOut">
               <a:rPr lang="en-DE" smtClean="0"/>
-              <a:t>13.12.22</a:t>
+              <a:t>14.12.22</a:t>
             </a:fld>
             <a:endParaRPr lang="en-DE"/>
           </a:p>
@@ -2694,7 +2694,7 @@
           <a:p>
             <a:fld id="{4BC9F52D-9A22-FD41-AB33-E3ECE032C061}" type="datetimeFigureOut">
               <a:rPr lang="en-DE" smtClean="0"/>
-              <a:t>13.12.22</a:t>
+              <a:t>14.12.22</a:t>
             </a:fld>
             <a:endParaRPr lang="en-DE"/>
           </a:p>
@@ -2937,7 +2937,7 @@
           <a:p>
             <a:fld id="{4BC9F52D-9A22-FD41-AB33-E3ECE032C061}" type="datetimeFigureOut">
               <a:rPr lang="en-DE" smtClean="0"/>
-              <a:t>13.12.22</a:t>
+              <a:t>14.12.22</a:t>
             </a:fld>
             <a:endParaRPr lang="en-DE"/>
           </a:p>
@@ -5616,7 +5616,7 @@
               <a:rPr lang="en-DE" sz="3500" dirty="0">
                 <a:latin typeface="Helvetica" pitchFamily="2" charset="0"/>
               </a:rPr>
-              <a:t>Time: 30 min</a:t>
+              <a:t>Time: 15 min</a:t>
             </a:r>
           </a:p>
           <a:p>

</xml_diff>